<commit_message>
Update project03 - 기능 정리 - 기범.pptx
</commit_message>
<xml_diff>
--- a/기능 정리/project03 - 기능 정리 - 기범.pptx
+++ b/기능 정리/project03 - 기능 정리 - 기범.pptx
@@ -7,8 +7,9 @@
   <p:sldIdLst>
     <p:sldId id="260" r:id="rId2"/>
     <p:sldId id="258" r:id="rId3"/>
-    <p:sldId id="257" r:id="rId4"/>
-    <p:sldId id="259" r:id="rId5"/>
+    <p:sldId id="261" r:id="rId4"/>
+    <p:sldId id="257" r:id="rId5"/>
+    <p:sldId id="259" r:id="rId6"/>
   </p:sldIdLst>
   <p:sldSz cx="12192000" cy="6858000"/>
   <p:notesSz cx="6858000" cy="9144000"/>
@@ -109,7 +110,7 @@
   </p:defaultTextStyle>
   <p:extLst>
     <p:ext uri="{EFAFB233-063F-42B5-8137-9DF3F51BA10A}">
-      <p15:sldGuideLst xmlns:p15="http://schemas.microsoft.com/office/powerpoint/2012/main"/>
+      <p15:sldGuideLst xmlns:p15="http://schemas.microsoft.com/office/powerpoint/2012/main" xmlns=""/>
     </p:ext>
   </p:extLst>
 </p:presentation>
@@ -246,7 +247,8 @@
           <a:p>
             <a:fld id="{E0C64F5E-737F-4F6B-9F15-DAA8DB3BF429}" type="datetimeFigureOut">
               <a:rPr lang="ko-KR" altLang="en-US" smtClean="0"/>
-              <a:t>2020-01-31</a:t>
+              <a:pPr/>
+              <a:t>2020-02-02</a:t>
             </a:fld>
             <a:endParaRPr lang="ko-KR" altLang="en-US"/>
           </a:p>
@@ -288,6 +290,7 @@
           <a:p>
             <a:fld id="{065A4F53-6DA0-4604-B445-FF63587F1A89}" type="slidenum">
               <a:rPr lang="ko-KR" altLang="en-US" smtClean="0"/>
+              <a:pPr/>
               <a:t>‹#›</a:t>
             </a:fld>
             <a:endParaRPr lang="ko-KR" altLang="en-US"/>
@@ -297,7 +300,7 @@
     </p:spTree>
     <p:extLst>
       <p:ext uri="{BB962C8B-B14F-4D97-AF65-F5344CB8AC3E}">
-        <p14:creationId xmlns:p14="http://schemas.microsoft.com/office/powerpoint/2010/main" val="3211947856"/>
+        <p14:creationId xmlns:p14="http://schemas.microsoft.com/office/powerpoint/2010/main" xmlns="" val="3211947856"/>
       </p:ext>
     </p:extLst>
   </p:cSld>
@@ -416,7 +419,8 @@
           <a:p>
             <a:fld id="{E0C64F5E-737F-4F6B-9F15-DAA8DB3BF429}" type="datetimeFigureOut">
               <a:rPr lang="ko-KR" altLang="en-US" smtClean="0"/>
-              <a:t>2020-01-31</a:t>
+              <a:pPr/>
+              <a:t>2020-02-02</a:t>
             </a:fld>
             <a:endParaRPr lang="ko-KR" altLang="en-US"/>
           </a:p>
@@ -458,6 +462,7 @@
           <a:p>
             <a:fld id="{065A4F53-6DA0-4604-B445-FF63587F1A89}" type="slidenum">
               <a:rPr lang="ko-KR" altLang="en-US" smtClean="0"/>
+              <a:pPr/>
               <a:t>‹#›</a:t>
             </a:fld>
             <a:endParaRPr lang="ko-KR" altLang="en-US"/>
@@ -467,7 +472,7 @@
     </p:spTree>
     <p:extLst>
       <p:ext uri="{BB962C8B-B14F-4D97-AF65-F5344CB8AC3E}">
-        <p14:creationId xmlns:p14="http://schemas.microsoft.com/office/powerpoint/2010/main" val="3557075651"/>
+        <p14:creationId xmlns:p14="http://schemas.microsoft.com/office/powerpoint/2010/main" xmlns="" val="3557075651"/>
       </p:ext>
     </p:extLst>
   </p:cSld>
@@ -596,7 +601,8 @@
           <a:p>
             <a:fld id="{E0C64F5E-737F-4F6B-9F15-DAA8DB3BF429}" type="datetimeFigureOut">
               <a:rPr lang="ko-KR" altLang="en-US" smtClean="0"/>
-              <a:t>2020-01-31</a:t>
+              <a:pPr/>
+              <a:t>2020-02-02</a:t>
             </a:fld>
             <a:endParaRPr lang="ko-KR" altLang="en-US"/>
           </a:p>
@@ -638,6 +644,7 @@
           <a:p>
             <a:fld id="{065A4F53-6DA0-4604-B445-FF63587F1A89}" type="slidenum">
               <a:rPr lang="ko-KR" altLang="en-US" smtClean="0"/>
+              <a:pPr/>
               <a:t>‹#›</a:t>
             </a:fld>
             <a:endParaRPr lang="ko-KR" altLang="en-US"/>
@@ -647,7 +654,7 @@
     </p:spTree>
     <p:extLst>
       <p:ext uri="{BB962C8B-B14F-4D97-AF65-F5344CB8AC3E}">
-        <p14:creationId xmlns:p14="http://schemas.microsoft.com/office/powerpoint/2010/main" val="2844809116"/>
+        <p14:creationId xmlns:p14="http://schemas.microsoft.com/office/powerpoint/2010/main" xmlns="" val="2844809116"/>
       </p:ext>
     </p:extLst>
   </p:cSld>
@@ -766,7 +773,8 @@
           <a:p>
             <a:fld id="{E0C64F5E-737F-4F6B-9F15-DAA8DB3BF429}" type="datetimeFigureOut">
               <a:rPr lang="ko-KR" altLang="en-US" smtClean="0"/>
-              <a:t>2020-01-31</a:t>
+              <a:pPr/>
+              <a:t>2020-02-02</a:t>
             </a:fld>
             <a:endParaRPr lang="ko-KR" altLang="en-US"/>
           </a:p>
@@ -808,6 +816,7 @@
           <a:p>
             <a:fld id="{065A4F53-6DA0-4604-B445-FF63587F1A89}" type="slidenum">
               <a:rPr lang="ko-KR" altLang="en-US" smtClean="0"/>
+              <a:pPr/>
               <a:t>‹#›</a:t>
             </a:fld>
             <a:endParaRPr lang="ko-KR" altLang="en-US"/>
@@ -817,7 +826,7 @@
     </p:spTree>
     <p:extLst>
       <p:ext uri="{BB962C8B-B14F-4D97-AF65-F5344CB8AC3E}">
-        <p14:creationId xmlns:p14="http://schemas.microsoft.com/office/powerpoint/2010/main" val="1326737202"/>
+        <p14:creationId xmlns:p14="http://schemas.microsoft.com/office/powerpoint/2010/main" xmlns="" val="1326737202"/>
       </p:ext>
     </p:extLst>
   </p:cSld>
@@ -1012,7 +1021,8 @@
           <a:p>
             <a:fld id="{E0C64F5E-737F-4F6B-9F15-DAA8DB3BF429}" type="datetimeFigureOut">
               <a:rPr lang="ko-KR" altLang="en-US" smtClean="0"/>
-              <a:t>2020-01-31</a:t>
+              <a:pPr/>
+              <a:t>2020-02-02</a:t>
             </a:fld>
             <a:endParaRPr lang="ko-KR" altLang="en-US"/>
           </a:p>
@@ -1054,6 +1064,7 @@
           <a:p>
             <a:fld id="{065A4F53-6DA0-4604-B445-FF63587F1A89}" type="slidenum">
               <a:rPr lang="ko-KR" altLang="en-US" smtClean="0"/>
+              <a:pPr/>
               <a:t>‹#›</a:t>
             </a:fld>
             <a:endParaRPr lang="ko-KR" altLang="en-US"/>
@@ -1063,7 +1074,7 @@
     </p:spTree>
     <p:extLst>
       <p:ext uri="{BB962C8B-B14F-4D97-AF65-F5344CB8AC3E}">
-        <p14:creationId xmlns:p14="http://schemas.microsoft.com/office/powerpoint/2010/main" val="2033943450"/>
+        <p14:creationId xmlns:p14="http://schemas.microsoft.com/office/powerpoint/2010/main" xmlns="" val="2033943450"/>
       </p:ext>
     </p:extLst>
   </p:cSld>
@@ -1244,7 +1255,8 @@
           <a:p>
             <a:fld id="{E0C64F5E-737F-4F6B-9F15-DAA8DB3BF429}" type="datetimeFigureOut">
               <a:rPr lang="ko-KR" altLang="en-US" smtClean="0"/>
-              <a:t>2020-01-31</a:t>
+              <a:pPr/>
+              <a:t>2020-02-02</a:t>
             </a:fld>
             <a:endParaRPr lang="ko-KR" altLang="en-US"/>
           </a:p>
@@ -1286,6 +1298,7 @@
           <a:p>
             <a:fld id="{065A4F53-6DA0-4604-B445-FF63587F1A89}" type="slidenum">
               <a:rPr lang="ko-KR" altLang="en-US" smtClean="0"/>
+              <a:pPr/>
               <a:t>‹#›</a:t>
             </a:fld>
             <a:endParaRPr lang="ko-KR" altLang="en-US"/>
@@ -1295,7 +1308,7 @@
     </p:spTree>
     <p:extLst>
       <p:ext uri="{BB962C8B-B14F-4D97-AF65-F5344CB8AC3E}">
-        <p14:creationId xmlns:p14="http://schemas.microsoft.com/office/powerpoint/2010/main" val="1221822053"/>
+        <p14:creationId xmlns:p14="http://schemas.microsoft.com/office/powerpoint/2010/main" xmlns="" val="1221822053"/>
       </p:ext>
     </p:extLst>
   </p:cSld>
@@ -1611,7 +1624,8 @@
           <a:p>
             <a:fld id="{E0C64F5E-737F-4F6B-9F15-DAA8DB3BF429}" type="datetimeFigureOut">
               <a:rPr lang="ko-KR" altLang="en-US" smtClean="0"/>
-              <a:t>2020-01-31</a:t>
+              <a:pPr/>
+              <a:t>2020-02-02</a:t>
             </a:fld>
             <a:endParaRPr lang="ko-KR" altLang="en-US"/>
           </a:p>
@@ -1653,6 +1667,7 @@
           <a:p>
             <a:fld id="{065A4F53-6DA0-4604-B445-FF63587F1A89}" type="slidenum">
               <a:rPr lang="ko-KR" altLang="en-US" smtClean="0"/>
+              <a:pPr/>
               <a:t>‹#›</a:t>
             </a:fld>
             <a:endParaRPr lang="ko-KR" altLang="en-US"/>
@@ -1662,7 +1677,7 @@
     </p:spTree>
     <p:extLst>
       <p:ext uri="{BB962C8B-B14F-4D97-AF65-F5344CB8AC3E}">
-        <p14:creationId xmlns:p14="http://schemas.microsoft.com/office/powerpoint/2010/main" val="1198756408"/>
+        <p14:creationId xmlns:p14="http://schemas.microsoft.com/office/powerpoint/2010/main" xmlns="" val="1198756408"/>
       </p:ext>
     </p:extLst>
   </p:cSld>
@@ -1729,7 +1744,8 @@
           <a:p>
             <a:fld id="{E0C64F5E-737F-4F6B-9F15-DAA8DB3BF429}" type="datetimeFigureOut">
               <a:rPr lang="ko-KR" altLang="en-US" smtClean="0"/>
-              <a:t>2020-01-31</a:t>
+              <a:pPr/>
+              <a:t>2020-02-02</a:t>
             </a:fld>
             <a:endParaRPr lang="ko-KR" altLang="en-US"/>
           </a:p>
@@ -1771,6 +1787,7 @@
           <a:p>
             <a:fld id="{065A4F53-6DA0-4604-B445-FF63587F1A89}" type="slidenum">
               <a:rPr lang="ko-KR" altLang="en-US" smtClean="0"/>
+              <a:pPr/>
               <a:t>‹#›</a:t>
             </a:fld>
             <a:endParaRPr lang="ko-KR" altLang="en-US"/>
@@ -1780,7 +1797,7 @@
     </p:spTree>
     <p:extLst>
       <p:ext uri="{BB962C8B-B14F-4D97-AF65-F5344CB8AC3E}">
-        <p14:creationId xmlns:p14="http://schemas.microsoft.com/office/powerpoint/2010/main" val="2662602006"/>
+        <p14:creationId xmlns:p14="http://schemas.microsoft.com/office/powerpoint/2010/main" xmlns="" val="2662602006"/>
       </p:ext>
     </p:extLst>
   </p:cSld>
@@ -1824,7 +1841,8 @@
           <a:p>
             <a:fld id="{E0C64F5E-737F-4F6B-9F15-DAA8DB3BF429}" type="datetimeFigureOut">
               <a:rPr lang="ko-KR" altLang="en-US" smtClean="0"/>
-              <a:t>2020-01-31</a:t>
+              <a:pPr/>
+              <a:t>2020-02-02</a:t>
             </a:fld>
             <a:endParaRPr lang="ko-KR" altLang="en-US"/>
           </a:p>
@@ -1866,6 +1884,7 @@
           <a:p>
             <a:fld id="{065A4F53-6DA0-4604-B445-FF63587F1A89}" type="slidenum">
               <a:rPr lang="ko-KR" altLang="en-US" smtClean="0"/>
+              <a:pPr/>
               <a:t>‹#›</a:t>
             </a:fld>
             <a:endParaRPr lang="ko-KR" altLang="en-US"/>
@@ -1875,7 +1894,7 @@
     </p:spTree>
     <p:extLst>
       <p:ext uri="{BB962C8B-B14F-4D97-AF65-F5344CB8AC3E}">
-        <p14:creationId xmlns:p14="http://schemas.microsoft.com/office/powerpoint/2010/main" val="3182925225"/>
+        <p14:creationId xmlns:p14="http://schemas.microsoft.com/office/powerpoint/2010/main" xmlns="" val="3182925225"/>
       </p:ext>
     </p:extLst>
   </p:cSld>
@@ -2101,7 +2120,8 @@
           <a:p>
             <a:fld id="{E0C64F5E-737F-4F6B-9F15-DAA8DB3BF429}" type="datetimeFigureOut">
               <a:rPr lang="ko-KR" altLang="en-US" smtClean="0"/>
-              <a:t>2020-01-31</a:t>
+              <a:pPr/>
+              <a:t>2020-02-02</a:t>
             </a:fld>
             <a:endParaRPr lang="ko-KR" altLang="en-US"/>
           </a:p>
@@ -2143,6 +2163,7 @@
           <a:p>
             <a:fld id="{065A4F53-6DA0-4604-B445-FF63587F1A89}" type="slidenum">
               <a:rPr lang="ko-KR" altLang="en-US" smtClean="0"/>
+              <a:pPr/>
               <a:t>‹#›</a:t>
             </a:fld>
             <a:endParaRPr lang="ko-KR" altLang="en-US"/>
@@ -2152,7 +2173,7 @@
     </p:spTree>
     <p:extLst>
       <p:ext uri="{BB962C8B-B14F-4D97-AF65-F5344CB8AC3E}">
-        <p14:creationId xmlns:p14="http://schemas.microsoft.com/office/powerpoint/2010/main" val="2055981885"/>
+        <p14:creationId xmlns:p14="http://schemas.microsoft.com/office/powerpoint/2010/main" xmlns="" val="2055981885"/>
       </p:ext>
     </p:extLst>
   </p:cSld>
@@ -2354,7 +2375,8 @@
           <a:p>
             <a:fld id="{E0C64F5E-737F-4F6B-9F15-DAA8DB3BF429}" type="datetimeFigureOut">
               <a:rPr lang="ko-KR" altLang="en-US" smtClean="0"/>
-              <a:t>2020-01-31</a:t>
+              <a:pPr/>
+              <a:t>2020-02-02</a:t>
             </a:fld>
             <a:endParaRPr lang="ko-KR" altLang="en-US"/>
           </a:p>
@@ -2396,6 +2418,7 @@
           <a:p>
             <a:fld id="{065A4F53-6DA0-4604-B445-FF63587F1A89}" type="slidenum">
               <a:rPr lang="ko-KR" altLang="en-US" smtClean="0"/>
+              <a:pPr/>
               <a:t>‹#›</a:t>
             </a:fld>
             <a:endParaRPr lang="ko-KR" altLang="en-US"/>
@@ -2405,7 +2428,7 @@
     </p:spTree>
     <p:extLst>
       <p:ext uri="{BB962C8B-B14F-4D97-AF65-F5344CB8AC3E}">
-        <p14:creationId xmlns:p14="http://schemas.microsoft.com/office/powerpoint/2010/main" val="2380209205"/>
+        <p14:creationId xmlns:p14="http://schemas.microsoft.com/office/powerpoint/2010/main" xmlns="" val="2380209205"/>
       </p:ext>
     </p:extLst>
   </p:cSld>
@@ -2567,7 +2590,8 @@
           <a:p>
             <a:fld id="{E0C64F5E-737F-4F6B-9F15-DAA8DB3BF429}" type="datetimeFigureOut">
               <a:rPr lang="ko-KR" altLang="en-US" smtClean="0"/>
-              <a:t>2020-01-31</a:t>
+              <a:pPr/>
+              <a:t>2020-02-02</a:t>
             </a:fld>
             <a:endParaRPr lang="ko-KR" altLang="en-US"/>
           </a:p>
@@ -2645,6 +2669,7 @@
           <a:p>
             <a:fld id="{065A4F53-6DA0-4604-B445-FF63587F1A89}" type="slidenum">
               <a:rPr lang="ko-KR" altLang="en-US" smtClean="0"/>
+              <a:pPr/>
               <a:t>‹#›</a:t>
             </a:fld>
             <a:endParaRPr lang="ko-KR" altLang="en-US"/>
@@ -2654,7 +2679,7 @@
     </p:spTree>
     <p:extLst>
       <p:ext uri="{BB962C8B-B14F-4D97-AF65-F5344CB8AC3E}">
-        <p14:creationId xmlns:p14="http://schemas.microsoft.com/office/powerpoint/2010/main" val="3261781086"/>
+        <p14:creationId xmlns:p14="http://schemas.microsoft.com/office/powerpoint/2010/main" xmlns="" val="3261781086"/>
       </p:ext>
     </p:extLst>
   </p:cSld>
@@ -3021,7 +3046,7 @@
     </p:spTree>
     <p:extLst>
       <p:ext uri="{BB962C8B-B14F-4D97-AF65-F5344CB8AC3E}">
-        <p14:creationId xmlns:p14="http://schemas.microsoft.com/office/powerpoint/2010/main" val="3189965589"/>
+        <p14:creationId xmlns:p14="http://schemas.microsoft.com/office/powerpoint/2010/main" xmlns="" val="3189965589"/>
       </p:ext>
     </p:extLst>
   </p:cSld>
@@ -3183,6 +3208,31 @@
             <a:endParaRPr lang="en-US" altLang="ko-KR" dirty="0" smtClean="0"/>
           </a:p>
           <a:p>
+            <a:r>
+              <a:rPr lang="en-US" altLang="ko-KR" dirty="0" smtClean="0"/>
+              <a:t>1</a:t>
+            </a:r>
+            <a:r>
+              <a:rPr lang="ko-KR" altLang="en-US" dirty="0" smtClean="0"/>
+              <a:t>대</a:t>
+            </a:r>
+            <a:r>
+              <a:rPr lang="en-US" altLang="ko-KR" dirty="0" smtClean="0"/>
+              <a:t>1 </a:t>
+            </a:r>
+            <a:r>
+              <a:rPr lang="ko-KR" altLang="en-US" dirty="0" smtClean="0"/>
+              <a:t>채팅 상담</a:t>
+            </a:r>
+            <a:endParaRPr lang="en-US" altLang="ko-KR" dirty="0" smtClean="0"/>
+          </a:p>
+          <a:p>
+            <a:pPr>
+              <a:buNone/>
+            </a:pPr>
+            <a:endParaRPr lang="en-US" altLang="ko-KR" dirty="0" smtClean="0"/>
+          </a:p>
+          <a:p>
             <a:endParaRPr lang="en-US" altLang="ko-KR" dirty="0" smtClean="0"/>
           </a:p>
           <a:p>
@@ -3196,7 +3246,7 @@
     </p:spTree>
     <p:extLst>
       <p:ext uri="{BB962C8B-B14F-4D97-AF65-F5344CB8AC3E}">
-        <p14:creationId xmlns:p14="http://schemas.microsoft.com/office/powerpoint/2010/main" val="2796244275"/>
+        <p14:creationId xmlns:p14="http://schemas.microsoft.com/office/powerpoint/2010/main" xmlns="" val="2796244275"/>
       </p:ext>
     </p:extLst>
   </p:cSld>
@@ -3225,135 +3275,481 @@
       </p:grpSpPr>
       <p:sp>
         <p:nvSpPr>
-          <p:cNvPr id="2" name="제목 1"/>
-          <p:cNvSpPr>
-            <a:spLocks noGrp="1"/>
-          </p:cNvSpPr>
-          <p:nvPr>
-            <p:ph type="title"/>
-          </p:nvPr>
-        </p:nvSpPr>
-        <p:spPr/>
-        <p:txBody>
-          <a:bodyPr/>
-          <a:lstStyle/>
-          <a:p>
-            <a:r>
-              <a:rPr lang="ko-KR" altLang="en-US" dirty="0" smtClean="0"/>
-              <a:t>관리자 기능</a:t>
-            </a:r>
-            <a:endParaRPr lang="ko-KR" altLang="en-US" dirty="0"/>
-          </a:p>
-        </p:txBody>
-      </p:sp>
-      <p:sp>
-        <p:nvSpPr>
-          <p:cNvPr id="3" name="내용 개체 틀 2"/>
-          <p:cNvSpPr>
-            <a:spLocks noGrp="1"/>
-          </p:cNvSpPr>
-          <p:nvPr>
-            <p:ph idx="1"/>
-          </p:nvPr>
-        </p:nvSpPr>
-        <p:spPr/>
-        <p:txBody>
-          <a:bodyPr/>
-          <a:lstStyle/>
-          <a:p>
-            <a:r>
-              <a:rPr lang="ko-KR" altLang="en-US" dirty="0" smtClean="0"/>
-              <a:t>회원관리</a:t>
-            </a:r>
-            <a:endParaRPr lang="en-US" altLang="ko-KR" dirty="0" smtClean="0"/>
-          </a:p>
-          <a:p>
-            <a:r>
-              <a:rPr lang="ko-KR" altLang="en-US" dirty="0" err="1" smtClean="0"/>
-              <a:t>크라우드</a:t>
-            </a:r>
-            <a:r>
-              <a:rPr lang="ko-KR" altLang="en-US" dirty="0" smtClean="0"/>
-              <a:t> </a:t>
-            </a:r>
-            <a:r>
-              <a:rPr lang="ko-KR" altLang="en-US" dirty="0" err="1" smtClean="0"/>
-              <a:t>펀딩</a:t>
-            </a:r>
-            <a:r>
-              <a:rPr lang="ko-KR" altLang="en-US" dirty="0" smtClean="0"/>
-              <a:t> 및 </a:t>
-            </a:r>
-            <a:r>
-              <a:rPr lang="ko-KR" altLang="en-US" dirty="0" err="1" smtClean="0"/>
-              <a:t>리워</a:t>
-            </a:r>
-            <a:r>
-              <a:rPr lang="ko-KR" altLang="en-US" dirty="0" err="1" smtClean="0"/>
-              <a:t>드</a:t>
-            </a:r>
-            <a:r>
-              <a:rPr lang="ko-KR" altLang="en-US" dirty="0" smtClean="0"/>
-              <a:t> 오픈 신청 승인</a:t>
-            </a:r>
-            <a:r>
-              <a:rPr lang="en-US" altLang="ko-KR" dirty="0" smtClean="0"/>
-              <a:t>/</a:t>
-            </a:r>
-            <a:r>
-              <a:rPr lang="ko-KR" altLang="en-US" dirty="0" err="1" smtClean="0"/>
-              <a:t>미승인</a:t>
-            </a:r>
-            <a:endParaRPr lang="en-US" altLang="ko-KR" dirty="0" smtClean="0"/>
-          </a:p>
-          <a:p>
-            <a:r>
-              <a:rPr lang="ko-KR" altLang="en-US" dirty="0" smtClean="0"/>
-              <a:t>공지사항 및 </a:t>
-            </a:r>
-            <a:r>
-              <a:rPr lang="en-US" altLang="ko-KR" dirty="0" err="1" smtClean="0"/>
-              <a:t>QnA</a:t>
-            </a:r>
-            <a:r>
-              <a:rPr lang="en-US" altLang="ko-KR" dirty="0" smtClean="0"/>
-              <a:t> </a:t>
-            </a:r>
-            <a:r>
-              <a:rPr lang="ko-KR" altLang="en-US" dirty="0" smtClean="0"/>
-              <a:t>관리</a:t>
-            </a:r>
-            <a:endParaRPr lang="en-US" altLang="ko-KR" dirty="0" smtClean="0"/>
-          </a:p>
-          <a:p>
-            <a:r>
-              <a:rPr lang="ko-KR" altLang="en-US" dirty="0" smtClean="0"/>
-              <a:t>사업자 관리 </a:t>
-            </a:r>
-            <a:r>
-              <a:rPr lang="en-US" altLang="ko-KR" dirty="0" smtClean="0"/>
-              <a:t>(</a:t>
-            </a:r>
-            <a:r>
-              <a:rPr lang="ko-KR" altLang="en-US" dirty="0" smtClean="0"/>
-              <a:t>사기 신고 받은 경우 해당 사업자 계정 탈퇴</a:t>
-            </a:r>
-            <a:r>
-              <a:rPr lang="en-US" altLang="ko-KR" dirty="0" smtClean="0"/>
-              <a:t>)</a:t>
-            </a:r>
-          </a:p>
-          <a:p>
-            <a:endParaRPr lang="ko-KR" altLang="en-US" dirty="0"/>
+          <p:cNvPr id="4" name="직사각형 3"/>
+          <p:cNvSpPr/>
+          <p:nvPr/>
+        </p:nvSpPr>
+        <p:spPr>
+          <a:xfrm>
+            <a:off x="856735" y="683742"/>
+            <a:ext cx="1532238" cy="1878226"/>
+          </a:xfrm>
+          <a:prstGeom prst="rect">
+            <a:avLst/>
+          </a:prstGeom>
+          <a:noFill/>
+        </p:spPr>
+        <p:style>
+          <a:lnRef idx="2">
+            <a:schemeClr val="accent1">
+              <a:shade val="50000"/>
+            </a:schemeClr>
+          </a:lnRef>
+          <a:fillRef idx="1">
+            <a:schemeClr val="accent1"/>
+          </a:fillRef>
+          <a:effectRef idx="0">
+            <a:schemeClr val="accent1"/>
+          </a:effectRef>
+          <a:fontRef idx="minor">
+            <a:schemeClr val="lt1"/>
+          </a:fontRef>
+        </p:style>
+        <p:txBody>
+          <a:bodyPr rtlCol="0" anchor="ctr"/>
+          <a:lstStyle/>
+          <a:p>
+            <a:pPr algn="ctr"/>
+            <a:r>
+              <a:rPr lang="ko-KR" altLang="en-US" sz="1200" dirty="0" smtClean="0">
+                <a:solidFill>
+                  <a:schemeClr val="tx1"/>
+                </a:solidFill>
+              </a:rPr>
+              <a:t>아이</a:t>
+            </a:r>
+            <a:r>
+              <a:rPr lang="ko-KR" altLang="en-US" sz="1200" dirty="0" smtClean="0">
+                <a:solidFill>
+                  <a:schemeClr val="tx1"/>
+                </a:solidFill>
+              </a:rPr>
+              <a:t>디</a:t>
+            </a:r>
+            <a:r>
+              <a:rPr lang="en-US" altLang="ko-KR" sz="1200" dirty="0" smtClean="0">
+                <a:solidFill>
+                  <a:schemeClr val="tx1"/>
+                </a:solidFill>
+              </a:rPr>
+              <a:t>(PK)</a:t>
+            </a:r>
+          </a:p>
+          <a:p>
+            <a:pPr algn="ctr"/>
+            <a:r>
+              <a:rPr lang="ko-KR" altLang="en-US" sz="1200" dirty="0" smtClean="0">
+                <a:solidFill>
+                  <a:schemeClr val="tx1"/>
+                </a:solidFill>
+              </a:rPr>
+              <a:t>패스워드</a:t>
+            </a:r>
+            <a:endParaRPr lang="en-US" altLang="ko-KR" sz="1200" dirty="0" smtClean="0">
+              <a:solidFill>
+                <a:schemeClr val="tx1"/>
+              </a:solidFill>
+            </a:endParaRPr>
+          </a:p>
+          <a:p>
+            <a:pPr algn="ctr"/>
+            <a:r>
+              <a:rPr lang="ko-KR" altLang="en-US" sz="1200" dirty="0" smtClean="0">
+                <a:solidFill>
+                  <a:schemeClr val="tx1"/>
+                </a:solidFill>
+              </a:rPr>
+              <a:t>주소</a:t>
+            </a:r>
+            <a:endParaRPr lang="en-US" altLang="ko-KR" sz="1200" dirty="0" smtClean="0">
+              <a:solidFill>
+                <a:schemeClr val="tx1"/>
+              </a:solidFill>
+            </a:endParaRPr>
+          </a:p>
+          <a:p>
+            <a:pPr algn="ctr"/>
+            <a:r>
+              <a:rPr lang="ko-KR" altLang="en-US" sz="1200" dirty="0" smtClean="0">
+                <a:solidFill>
+                  <a:schemeClr val="tx1"/>
+                </a:solidFill>
+              </a:rPr>
+              <a:t>휴대전화번호</a:t>
+            </a:r>
+            <a:endParaRPr lang="en-US" altLang="ko-KR" sz="1200" dirty="0" smtClean="0">
+              <a:solidFill>
+                <a:schemeClr val="tx1"/>
+              </a:solidFill>
+            </a:endParaRPr>
+          </a:p>
+          <a:p>
+            <a:pPr algn="ctr"/>
+            <a:r>
+              <a:rPr lang="ko-KR" altLang="en-US" sz="1200" dirty="0" smtClean="0">
+                <a:solidFill>
+                  <a:schemeClr val="tx1"/>
+                </a:solidFill>
+              </a:rPr>
+              <a:t>결제 유무</a:t>
+            </a:r>
+            <a:endParaRPr lang="en-US" altLang="ko-KR" sz="1200" dirty="0" smtClean="0">
+              <a:solidFill>
+                <a:schemeClr val="tx1"/>
+              </a:solidFill>
+            </a:endParaRPr>
+          </a:p>
+          <a:p>
+            <a:pPr algn="ctr"/>
+            <a:r>
+              <a:rPr lang="ko-KR" altLang="en-US" sz="1200" dirty="0" err="1" smtClean="0">
+                <a:solidFill>
+                  <a:schemeClr val="tx1"/>
+                </a:solidFill>
+              </a:rPr>
+              <a:t>이메일</a:t>
+            </a:r>
+            <a:endParaRPr lang="en-US" altLang="ko-KR" sz="1200" dirty="0" smtClean="0">
+              <a:solidFill>
+                <a:schemeClr val="tx1"/>
+              </a:solidFill>
+            </a:endParaRPr>
+          </a:p>
+          <a:p>
+            <a:pPr algn="ctr"/>
+            <a:r>
+              <a:rPr lang="ko-KR" altLang="en-US" sz="1200" dirty="0" smtClean="0">
+                <a:solidFill>
+                  <a:schemeClr val="tx1"/>
+                </a:solidFill>
+              </a:rPr>
+              <a:t>사업자등록번호</a:t>
+            </a:r>
+            <a:endParaRPr lang="en-US" altLang="ko-KR" sz="1200" dirty="0" smtClean="0">
+              <a:solidFill>
+                <a:schemeClr val="tx1"/>
+              </a:solidFill>
+            </a:endParaRPr>
+          </a:p>
+          <a:p>
+            <a:pPr algn="ctr"/>
+            <a:endParaRPr lang="en-US" altLang="ko-KR" sz="1200" dirty="0" smtClean="0">
+              <a:solidFill>
+                <a:schemeClr val="tx1"/>
+              </a:solidFill>
+            </a:endParaRPr>
+          </a:p>
+          <a:p>
+            <a:pPr algn="ctr"/>
+            <a:endParaRPr lang="en-US" altLang="ko-KR" sz="1200" dirty="0" smtClean="0">
+              <a:solidFill>
+                <a:schemeClr val="tx1"/>
+              </a:solidFill>
+            </a:endParaRPr>
+          </a:p>
+          <a:p>
+            <a:pPr algn="ctr"/>
+            <a:endParaRPr lang="ko-KR" altLang="en-US" sz="1200" dirty="0">
+              <a:solidFill>
+                <a:schemeClr val="tx1"/>
+              </a:solidFill>
+            </a:endParaRPr>
+          </a:p>
+        </p:txBody>
+      </p:sp>
+      <p:sp>
+        <p:nvSpPr>
+          <p:cNvPr id="5" name="직사각형 4"/>
+          <p:cNvSpPr/>
+          <p:nvPr/>
+        </p:nvSpPr>
+        <p:spPr>
+          <a:xfrm>
+            <a:off x="856735" y="461319"/>
+            <a:ext cx="1532238" cy="214184"/>
+          </a:xfrm>
+          <a:prstGeom prst="rect">
+            <a:avLst/>
+          </a:prstGeom>
+        </p:spPr>
+        <p:style>
+          <a:lnRef idx="2">
+            <a:schemeClr val="accent1">
+              <a:shade val="50000"/>
+            </a:schemeClr>
+          </a:lnRef>
+          <a:fillRef idx="1">
+            <a:schemeClr val="accent1"/>
+          </a:fillRef>
+          <a:effectRef idx="0">
+            <a:schemeClr val="accent1"/>
+          </a:effectRef>
+          <a:fontRef idx="minor">
+            <a:schemeClr val="lt1"/>
+          </a:fontRef>
+        </p:style>
+        <p:txBody>
+          <a:bodyPr rtlCol="0" anchor="ctr"/>
+          <a:lstStyle/>
+          <a:p>
+            <a:pPr algn="ctr"/>
+            <a:r>
+              <a:rPr lang="ko-KR" altLang="en-US" sz="1400" dirty="0" smtClean="0"/>
+              <a:t>회원</a:t>
+            </a:r>
+            <a:endParaRPr lang="ko-KR" altLang="en-US" sz="1400" dirty="0"/>
+          </a:p>
+        </p:txBody>
+      </p:sp>
+      <p:sp>
+        <p:nvSpPr>
+          <p:cNvPr id="6" name="직사각형 5"/>
+          <p:cNvSpPr/>
+          <p:nvPr/>
+        </p:nvSpPr>
+        <p:spPr>
+          <a:xfrm>
+            <a:off x="2953303" y="679620"/>
+            <a:ext cx="1532238" cy="2434284"/>
+          </a:xfrm>
+          <a:prstGeom prst="rect">
+            <a:avLst/>
+          </a:prstGeom>
+          <a:noFill/>
+        </p:spPr>
+        <p:style>
+          <a:lnRef idx="2">
+            <a:schemeClr val="accent1">
+              <a:shade val="50000"/>
+            </a:schemeClr>
+          </a:lnRef>
+          <a:fillRef idx="1">
+            <a:schemeClr val="accent1"/>
+          </a:fillRef>
+          <a:effectRef idx="0">
+            <a:schemeClr val="accent1"/>
+          </a:effectRef>
+          <a:fontRef idx="minor">
+            <a:schemeClr val="lt1"/>
+          </a:fontRef>
+        </p:style>
+        <p:txBody>
+          <a:bodyPr rtlCol="0" anchor="ctr"/>
+          <a:lstStyle/>
+          <a:p>
+            <a:pPr algn="ctr"/>
+            <a:r>
+              <a:rPr lang="ko-KR" altLang="en-US" sz="1200" dirty="0" err="1" smtClean="0">
+                <a:solidFill>
+                  <a:schemeClr val="tx1"/>
+                </a:solidFill>
+              </a:rPr>
+              <a:t>글번</a:t>
+            </a:r>
+            <a:r>
+              <a:rPr lang="ko-KR" altLang="en-US" sz="1200" dirty="0" err="1" smtClean="0">
+                <a:solidFill>
+                  <a:schemeClr val="tx1"/>
+                </a:solidFill>
+              </a:rPr>
+              <a:t>호</a:t>
+            </a:r>
+            <a:r>
+              <a:rPr lang="en-US" altLang="ko-KR" sz="1200" dirty="0" smtClean="0">
+                <a:solidFill>
+                  <a:schemeClr val="tx1"/>
+                </a:solidFill>
+              </a:rPr>
+              <a:t>(PK)</a:t>
+            </a:r>
+          </a:p>
+          <a:p>
+            <a:pPr algn="ctr"/>
+            <a:r>
+              <a:rPr lang="ko-KR" altLang="en-US" sz="1200" dirty="0" smtClean="0">
+                <a:solidFill>
+                  <a:schemeClr val="tx1"/>
+                </a:solidFill>
+              </a:rPr>
+              <a:t>작성자</a:t>
+            </a:r>
+            <a:endParaRPr lang="en-US" altLang="ko-KR" sz="1200" dirty="0" smtClean="0">
+              <a:solidFill>
+                <a:schemeClr val="tx1"/>
+              </a:solidFill>
+            </a:endParaRPr>
+          </a:p>
+          <a:p>
+            <a:pPr algn="ctr"/>
+            <a:r>
+              <a:rPr lang="ko-KR" altLang="en-US" sz="1200" dirty="0" err="1" smtClean="0">
+                <a:solidFill>
+                  <a:schemeClr val="tx1"/>
+                </a:solidFill>
+              </a:rPr>
+              <a:t>게시글</a:t>
+            </a:r>
+            <a:r>
+              <a:rPr lang="ko-KR" altLang="en-US" sz="1200" dirty="0" smtClean="0">
+                <a:solidFill>
+                  <a:schemeClr val="tx1"/>
+                </a:solidFill>
+              </a:rPr>
+              <a:t> 제목</a:t>
+            </a:r>
+            <a:endParaRPr lang="en-US" altLang="ko-KR" sz="1200" dirty="0" smtClean="0">
+              <a:solidFill>
+                <a:schemeClr val="tx1"/>
+              </a:solidFill>
+            </a:endParaRPr>
+          </a:p>
+          <a:p>
+            <a:pPr algn="ctr"/>
+            <a:r>
+              <a:rPr lang="ko-KR" altLang="en-US" sz="1200" dirty="0" smtClean="0">
+                <a:solidFill>
+                  <a:schemeClr val="tx1"/>
+                </a:solidFill>
+              </a:rPr>
+              <a:t>등록날짜</a:t>
+            </a:r>
+            <a:endParaRPr lang="en-US" altLang="ko-KR" sz="1200" dirty="0" smtClean="0">
+              <a:solidFill>
+                <a:schemeClr val="tx1"/>
+              </a:solidFill>
+            </a:endParaRPr>
+          </a:p>
+          <a:p>
+            <a:pPr algn="ctr"/>
+            <a:r>
+              <a:rPr lang="ko-KR" altLang="en-US" sz="1200" dirty="0" smtClean="0">
+                <a:solidFill>
+                  <a:schemeClr val="tx1"/>
+                </a:solidFill>
+              </a:rPr>
+              <a:t>내용</a:t>
+            </a:r>
+            <a:endParaRPr lang="en-US" altLang="ko-KR" sz="1200" dirty="0" smtClean="0">
+              <a:solidFill>
+                <a:schemeClr val="tx1"/>
+              </a:solidFill>
+            </a:endParaRPr>
+          </a:p>
+          <a:p>
+            <a:pPr algn="ctr"/>
+            <a:r>
+              <a:rPr lang="ko-KR" altLang="en-US" sz="1200" dirty="0" smtClean="0">
+                <a:solidFill>
+                  <a:schemeClr val="tx1"/>
+                </a:solidFill>
+              </a:rPr>
+              <a:t>답변날짜</a:t>
+            </a:r>
+            <a:endParaRPr lang="en-US" altLang="ko-KR" sz="1200" dirty="0" smtClean="0">
+              <a:solidFill>
+                <a:schemeClr val="tx1"/>
+              </a:solidFill>
+            </a:endParaRPr>
+          </a:p>
+          <a:p>
+            <a:pPr algn="ctr"/>
+            <a:r>
+              <a:rPr lang="ko-KR" altLang="en-US" sz="1200" dirty="0" smtClean="0">
+                <a:solidFill>
+                  <a:schemeClr val="tx1"/>
+                </a:solidFill>
+              </a:rPr>
+              <a:t>답변 내용</a:t>
+            </a:r>
+            <a:endParaRPr lang="en-US" altLang="ko-KR" sz="1200" dirty="0" smtClean="0">
+              <a:solidFill>
+                <a:schemeClr val="tx1"/>
+              </a:solidFill>
+            </a:endParaRPr>
+          </a:p>
+          <a:p>
+            <a:pPr algn="ctr"/>
+            <a:endParaRPr lang="en-US" altLang="ko-KR" sz="1200" dirty="0" smtClean="0">
+              <a:solidFill>
+                <a:schemeClr val="tx1"/>
+              </a:solidFill>
+            </a:endParaRPr>
+          </a:p>
+          <a:p>
+            <a:pPr algn="ctr"/>
+            <a:endParaRPr lang="en-US" altLang="ko-KR" sz="1200" dirty="0" smtClean="0">
+              <a:solidFill>
+                <a:schemeClr val="tx1"/>
+              </a:solidFill>
+            </a:endParaRPr>
+          </a:p>
+          <a:p>
+            <a:pPr algn="ctr"/>
+            <a:endParaRPr lang="en-US" altLang="ko-KR" sz="1200" dirty="0" smtClean="0">
+              <a:solidFill>
+                <a:schemeClr val="tx1"/>
+              </a:solidFill>
+            </a:endParaRPr>
+          </a:p>
+          <a:p>
+            <a:pPr algn="ctr"/>
+            <a:endParaRPr lang="ko-KR" altLang="en-US" sz="1200" dirty="0">
+              <a:solidFill>
+                <a:schemeClr val="tx1"/>
+              </a:solidFill>
+            </a:endParaRPr>
+          </a:p>
+        </p:txBody>
+      </p:sp>
+      <p:sp>
+        <p:nvSpPr>
+          <p:cNvPr id="7" name="직사각형 6"/>
+          <p:cNvSpPr/>
+          <p:nvPr/>
+        </p:nvSpPr>
+        <p:spPr>
+          <a:xfrm>
+            <a:off x="2953303" y="457197"/>
+            <a:ext cx="1532238" cy="214184"/>
+          </a:xfrm>
+          <a:prstGeom prst="rect">
+            <a:avLst/>
+          </a:prstGeom>
+        </p:spPr>
+        <p:style>
+          <a:lnRef idx="2">
+            <a:schemeClr val="accent1">
+              <a:shade val="50000"/>
+            </a:schemeClr>
+          </a:lnRef>
+          <a:fillRef idx="1">
+            <a:schemeClr val="accent1"/>
+          </a:fillRef>
+          <a:effectRef idx="0">
+            <a:schemeClr val="accent1"/>
+          </a:effectRef>
+          <a:fontRef idx="minor">
+            <a:schemeClr val="lt1"/>
+          </a:fontRef>
+        </p:style>
+        <p:txBody>
+          <a:bodyPr rtlCol="0" anchor="ctr"/>
+          <a:lstStyle/>
+          <a:p>
+            <a:pPr algn="ctr"/>
+            <a:r>
+              <a:rPr lang="ko-KR" altLang="en-US" sz="1400" dirty="0" smtClean="0"/>
+              <a:t>커뮤니</a:t>
+            </a:r>
+            <a:r>
+              <a:rPr lang="ko-KR" altLang="en-US" sz="1400" dirty="0" smtClean="0"/>
+              <a:t>티</a:t>
+            </a:r>
+            <a:endParaRPr lang="ko-KR" altLang="en-US" sz="1400" dirty="0"/>
           </a:p>
         </p:txBody>
       </p:sp>
     </p:spTree>
-    <p:extLst>
-      <p:ext uri="{BB962C8B-B14F-4D97-AF65-F5344CB8AC3E}">
-        <p14:creationId xmlns:p14="http://schemas.microsoft.com/office/powerpoint/2010/main" val="4088106745"/>
-      </p:ext>
-    </p:extLst>
   </p:cSld>
   <p:clrMapOvr>
     <a:masterClrMapping/>
@@ -3395,6 +3791,157 @@
           <a:p>
             <a:r>
               <a:rPr lang="ko-KR" altLang="en-US" dirty="0" smtClean="0"/>
+              <a:t>관리자 기능</a:t>
+            </a:r>
+            <a:endParaRPr lang="ko-KR" altLang="en-US" dirty="0"/>
+          </a:p>
+        </p:txBody>
+      </p:sp>
+      <p:sp>
+        <p:nvSpPr>
+          <p:cNvPr id="3" name="내용 개체 틀 2"/>
+          <p:cNvSpPr>
+            <a:spLocks noGrp="1"/>
+          </p:cNvSpPr>
+          <p:nvPr>
+            <p:ph idx="1"/>
+          </p:nvPr>
+        </p:nvSpPr>
+        <p:spPr/>
+        <p:txBody>
+          <a:bodyPr/>
+          <a:lstStyle/>
+          <a:p>
+            <a:r>
+              <a:rPr lang="ko-KR" altLang="en-US" dirty="0" smtClean="0"/>
+              <a:t>회원관리</a:t>
+            </a:r>
+            <a:endParaRPr lang="en-US" altLang="ko-KR" dirty="0" smtClean="0"/>
+          </a:p>
+          <a:p>
+            <a:r>
+              <a:rPr lang="ko-KR" altLang="en-US" dirty="0" err="1" smtClean="0"/>
+              <a:t>크라우드</a:t>
+            </a:r>
+            <a:r>
+              <a:rPr lang="ko-KR" altLang="en-US" dirty="0" smtClean="0"/>
+              <a:t> </a:t>
+            </a:r>
+            <a:r>
+              <a:rPr lang="ko-KR" altLang="en-US" dirty="0" err="1" smtClean="0"/>
+              <a:t>펀딩</a:t>
+            </a:r>
+            <a:r>
+              <a:rPr lang="ko-KR" altLang="en-US" dirty="0" smtClean="0"/>
+              <a:t> 및 </a:t>
+            </a:r>
+            <a:r>
+              <a:rPr lang="ko-KR" altLang="en-US" dirty="0" err="1" smtClean="0"/>
+              <a:t>리워드</a:t>
+            </a:r>
+            <a:r>
+              <a:rPr lang="ko-KR" altLang="en-US" dirty="0" smtClean="0"/>
+              <a:t> 오픈 신청 승인</a:t>
+            </a:r>
+            <a:r>
+              <a:rPr lang="en-US" altLang="ko-KR" dirty="0" smtClean="0"/>
+              <a:t>/</a:t>
+            </a:r>
+            <a:r>
+              <a:rPr lang="ko-KR" altLang="en-US" dirty="0" err="1" smtClean="0"/>
+              <a:t>미승인</a:t>
+            </a:r>
+            <a:endParaRPr lang="en-US" altLang="ko-KR" dirty="0" smtClean="0"/>
+          </a:p>
+          <a:p>
+            <a:r>
+              <a:rPr lang="ko-KR" altLang="en-US" dirty="0" smtClean="0"/>
+              <a:t>공지사항 및 </a:t>
+            </a:r>
+            <a:r>
+              <a:rPr lang="en-US" altLang="ko-KR" dirty="0" err="1" smtClean="0"/>
+              <a:t>QnA</a:t>
+            </a:r>
+            <a:r>
+              <a:rPr lang="en-US" altLang="ko-KR" dirty="0" smtClean="0"/>
+              <a:t> </a:t>
+            </a:r>
+            <a:r>
+              <a:rPr lang="ko-KR" altLang="en-US" dirty="0" smtClean="0"/>
+              <a:t>관리</a:t>
+            </a:r>
+            <a:endParaRPr lang="en-US" altLang="ko-KR" dirty="0" smtClean="0"/>
+          </a:p>
+          <a:p>
+            <a:r>
+              <a:rPr lang="ko-KR" altLang="en-US" dirty="0" smtClean="0"/>
+              <a:t>사업자 관리 </a:t>
+            </a:r>
+            <a:r>
+              <a:rPr lang="en-US" altLang="ko-KR" dirty="0" smtClean="0"/>
+              <a:t>(</a:t>
+            </a:r>
+            <a:r>
+              <a:rPr lang="ko-KR" altLang="en-US" dirty="0" smtClean="0"/>
+              <a:t>사기 신고 받은 경우 해당 사업자 계정 탈퇴</a:t>
+            </a:r>
+            <a:r>
+              <a:rPr lang="en-US" altLang="ko-KR" dirty="0" smtClean="0"/>
+              <a:t>)</a:t>
+            </a:r>
+          </a:p>
+          <a:p>
+            <a:endParaRPr lang="ko-KR" altLang="en-US" dirty="0"/>
+          </a:p>
+        </p:txBody>
+      </p:sp>
+    </p:spTree>
+    <p:extLst>
+      <p:ext uri="{BB962C8B-B14F-4D97-AF65-F5344CB8AC3E}">
+        <p14:creationId xmlns:p14="http://schemas.microsoft.com/office/powerpoint/2010/main" xmlns="" val="4088106745"/>
+      </p:ext>
+    </p:extLst>
+  </p:cSld>
+  <p:clrMapOvr>
+    <a:masterClrMapping/>
+  </p:clrMapOvr>
+</p:sld>
+</file>
+
+<file path=ppt/slides/slide5.xml><?xml version="1.0" encoding="utf-8"?>
+<p:sld xmlns:a="http://schemas.openxmlformats.org/drawingml/2006/main" xmlns:r="http://schemas.openxmlformats.org/officeDocument/2006/relationships" xmlns:p="http://schemas.openxmlformats.org/presentationml/2006/main">
+  <p:cSld>
+    <p:spTree>
+      <p:nvGrpSpPr>
+        <p:cNvPr id="1" name=""/>
+        <p:cNvGrpSpPr/>
+        <p:nvPr/>
+      </p:nvGrpSpPr>
+      <p:grpSpPr>
+        <a:xfrm>
+          <a:off x="0" y="0"/>
+          <a:ext cx="0" cy="0"/>
+          <a:chOff x="0" y="0"/>
+          <a:chExt cx="0" cy="0"/>
+        </a:xfrm>
+      </p:grpSpPr>
+      <p:sp>
+        <p:nvSpPr>
+          <p:cNvPr id="2" name="제목 1"/>
+          <p:cNvSpPr>
+            <a:spLocks noGrp="1"/>
+          </p:cNvSpPr>
+          <p:nvPr>
+            <p:ph type="title"/>
+          </p:nvPr>
+        </p:nvSpPr>
+        <p:spPr/>
+        <p:txBody>
+          <a:bodyPr/>
+          <a:lstStyle/>
+          <a:p>
+            <a:r>
+              <a:rPr lang="ko-KR" altLang="en-US" dirty="0" smtClean="0"/>
               <a:t>기타 아무거나 넣고 싶은 기능</a:t>
             </a:r>
             <a:r>
@@ -3438,7 +3985,7 @@
     </p:spTree>
     <p:extLst>
       <p:ext uri="{BB962C8B-B14F-4D97-AF65-F5344CB8AC3E}">
-        <p14:creationId xmlns:p14="http://schemas.microsoft.com/office/powerpoint/2010/main" val="1558768620"/>
+        <p14:creationId xmlns:p14="http://schemas.microsoft.com/office/powerpoint/2010/main" xmlns="" val="1558768620"/>
       </p:ext>
     </p:extLst>
   </p:cSld>
@@ -3491,7 +4038,7 @@
     </a:clrScheme>
     <a:fontScheme name="Office">
       <a:majorFont>
-        <a:latin typeface="맑은 고딕" panose="020F0302020204030204"/>
+        <a:latin typeface="맑은 고딕"/>
         <a:ea typeface=""/>
         <a:cs typeface=""/>
         <a:font script="Jpan" typeface="ＭＳ Ｐゴシック"/>
@@ -3526,7 +4073,7 @@
         <a:font script="Geor" typeface="Sylfaen"/>
       </a:majorFont>
       <a:minorFont>
-        <a:latin typeface="맑은 고딕" panose="020F0502020204030204"/>
+        <a:latin typeface="맑은 고딕"/>
         <a:ea typeface=""/>
         <a:cs typeface=""/>
         <a:font script="Jpan" typeface="ＭＳ Ｐゴシック"/>
@@ -3703,7 +4250,7 @@
   <a:extraClrSchemeLst/>
   <a:extLst>
     <a:ext uri="{05A4C25C-085E-4340-85A3-A5531E510DB2}">
-      <thm15:themeFamily xmlns:thm15="http://schemas.microsoft.com/office/thememl/2012/main" name="Office Theme" id="{62F939B6-93AF-4DB8-9C6B-D6C7DFDC589F}" vid="{4A3C46E8-61CC-4603-A589-7422A47A8E4A}"/>
+      <thm15:themeFamily xmlns:thm15="http://schemas.microsoft.com/office/thememl/2012/main" xmlns="" name="Office Theme" id="{62F939B6-93AF-4DB8-9C6B-D6C7DFDC589F}" vid="{4A3C46E8-61CC-4603-A589-7422A47A8E4A}"/>
     </a:ext>
   </a:extLst>
 </a:theme>

</xml_diff>